<commit_message>
added fix for typos
</commit_message>
<xml_diff>
--- a/presentations/Intro_CF_at_TM.pptx
+++ b/presentations/Intro_CF_at_TM.pptx
@@ -8,10 +8,10 @@
     <p:sldMasterId id="2147483724" r:id="rId4"/>
   </p:sldMasterIdLst>
   <p:notesMasterIdLst>
-    <p:notesMasterId r:id="rId11"/>
+    <p:notesMasterId r:id="rId12"/>
   </p:notesMasterIdLst>
   <p:handoutMasterIdLst>
-    <p:handoutMasterId r:id="rId12"/>
+    <p:handoutMasterId r:id="rId13"/>
   </p:handoutMasterIdLst>
   <p:sldIdLst>
     <p:sldId id="353" r:id="rId5"/>
@@ -19,7 +19,8 @@
     <p:sldId id="373" r:id="rId7"/>
     <p:sldId id="374" r:id="rId8"/>
     <p:sldId id="375" r:id="rId9"/>
-    <p:sldId id="359" r:id="rId10"/>
+    <p:sldId id="376" r:id="rId10"/>
+    <p:sldId id="359" r:id="rId11"/>
   </p:sldIdLst>
   <p:sldSz cx="9144000" cy="5143500" type="screen16x9"/>
   <p:notesSz cx="6858000" cy="9144000"/>
@@ -128,6 +129,7 @@
             <p14:sldId id="373"/>
             <p14:sldId id="374"/>
             <p14:sldId id="375"/>
+            <p14:sldId id="376"/>
             <p14:sldId id="359"/>
           </p14:sldIdLst>
         </p14:section>
@@ -1189,6 +1191,111 @@
 </file>
 
 <file path=ppt/notesSlides/notesSlide6.xml><?xml version="1.0" encoding="utf-8"?>
+<p:notes xmlns:a="http://schemas.openxmlformats.org/drawingml/2006/main" xmlns:r="http://schemas.openxmlformats.org/officeDocument/2006/relationships" xmlns:p="http://schemas.openxmlformats.org/presentationml/2006/main" showMasterSp="0" showMasterPhAnim="0">
+  <p:cSld>
+    <p:spTree>
+      <p:nvGrpSpPr>
+        <p:cNvPr id="1" name="Shape 197"/>
+        <p:cNvGrpSpPr/>
+        <p:nvPr/>
+      </p:nvGrpSpPr>
+      <p:grpSpPr>
+        <a:xfrm>
+          <a:off x="0" y="0"/>
+          <a:ext cx="0" cy="0"/>
+          <a:chOff x="0" y="0"/>
+          <a:chExt cx="0" cy="0"/>
+        </a:xfrm>
+      </p:grpSpPr>
+      <p:sp>
+        <p:nvSpPr>
+          <p:cNvPr id="198" name="Shape 198"/>
+          <p:cNvSpPr txBox="1">
+            <a:spLocks noGrp="1"/>
+          </p:cNvSpPr>
+          <p:nvPr>
+            <p:ph type="body" idx="1"/>
+          </p:nvPr>
+        </p:nvSpPr>
+        <p:spPr>
+          <a:xfrm>
+            <a:off x="295171" y="2972430"/>
+            <a:ext cx="6267659" cy="5793719"/>
+          </a:xfrm>
+          <a:prstGeom prst="rect">
+            <a:avLst/>
+          </a:prstGeom>
+        </p:spPr>
+        <p:txBody>
+          <a:bodyPr lIns="90556" tIns="90556" rIns="90556" bIns="90556" anchor="t" anchorCtr="0">
+            <a:noAutofit/>
+          </a:bodyPr>
+          <a:lstStyle/>
+          <a:p>
+            <a:endParaRPr dirty="0"/>
+          </a:p>
+        </p:txBody>
+      </p:sp>
+      <p:sp>
+        <p:nvSpPr>
+          <p:cNvPr id="199" name="Shape 199"/>
+          <p:cNvSpPr>
+            <a:spLocks noGrp="1" noRot="1" noChangeAspect="1"/>
+          </p:cNvSpPr>
+          <p:nvPr>
+            <p:ph type="sldImg" idx="2"/>
+          </p:nvPr>
+        </p:nvSpPr>
+        <p:spPr>
+          <a:xfrm>
+            <a:off x="1606550" y="685800"/>
+            <a:ext cx="3702050" cy="2082800"/>
+          </a:xfrm>
+          <a:custGeom>
+            <a:avLst/>
+            <a:gdLst/>
+            <a:ahLst/>
+            <a:cxnLst/>
+            <a:rect l="0" t="0" r="0" b="0"/>
+            <a:pathLst>
+              <a:path w="120000" h="120000" extrusionOk="0">
+                <a:moveTo>
+                  <a:pt x="0" y="0"/>
+                </a:moveTo>
+                <a:lnTo>
+                  <a:pt x="120000" y="0"/>
+                </a:lnTo>
+                <a:lnTo>
+                  <a:pt x="120000" y="120000"/>
+                </a:lnTo>
+                <a:lnTo>
+                  <a:pt x="0" y="120000"/>
+                </a:lnTo>
+                <a:close/>
+              </a:path>
+            </a:pathLst>
+          </a:custGeom>
+          <a:noFill/>
+          <a:ln w="9525" cap="flat" cmpd="sng">
+            <a:solidFill>
+              <a:srgbClr val="000000"/>
+            </a:solidFill>
+            <a:prstDash val="solid"/>
+            <a:round/>
+            <a:headEnd type="none" w="med" len="med"/>
+            <a:tailEnd type="none" w="med" len="med"/>
+          </a:ln>
+        </p:spPr>
+      </p:sp>
+    </p:spTree>
+  </p:cSld>
+  <p:clrMapOvr>
+    <a:masterClrMapping/>
+  </p:clrMapOvr>
+</p:notes>
+</file>
+
+<file path=ppt/notesSlides/notesSlide7.xml><?xml version="1.0" encoding="utf-8"?>
 <p:notes xmlns:a="http://schemas.openxmlformats.org/drawingml/2006/main" xmlns:r="http://schemas.openxmlformats.org/officeDocument/2006/relationships" xmlns:p="http://schemas.openxmlformats.org/presentationml/2006/main" showMasterSp="0" showMasterPhAnim="0">
   <p:cSld>
     <p:spTree>
@@ -9285,12 +9392,6 @@
               </a:rPr>
               <a:t>TM</a:t>
             </a:r>
-            <a:endParaRPr lang="en-US" sz="2000" dirty="0" smtClean="0">
-              <a:solidFill>
-                <a:schemeClr val="accent6"/>
-              </a:solidFill>
-              <a:sym typeface="Arial"/>
-            </a:endParaRPr>
           </a:p>
           <a:p>
             <a:pPr marL="285750" lvl="0" indent="-285750">
@@ -9475,6 +9576,132 @@
 </file>
 
 <file path=ppt/slides/slide6.xml><?xml version="1.0" encoding="utf-8"?>
+<p:sld xmlns:a="http://schemas.openxmlformats.org/drawingml/2006/main" xmlns:r="http://schemas.openxmlformats.org/officeDocument/2006/relationships" xmlns:p="http://schemas.openxmlformats.org/presentationml/2006/main">
+  <p:cSld>
+    <p:spTree>
+      <p:nvGrpSpPr>
+        <p:cNvPr id="1" name="Shape 194"/>
+        <p:cNvGrpSpPr/>
+        <p:nvPr/>
+      </p:nvGrpSpPr>
+      <p:grpSpPr>
+        <a:xfrm>
+          <a:off x="0" y="0"/>
+          <a:ext cx="0" cy="0"/>
+          <a:chOff x="0" y="0"/>
+          <a:chExt cx="0" cy="0"/>
+        </a:xfrm>
+      </p:grpSpPr>
+      <p:sp>
+        <p:nvSpPr>
+          <p:cNvPr id="195" name="Shape 195"/>
+          <p:cNvSpPr txBox="1">
+            <a:spLocks noGrp="1"/>
+          </p:cNvSpPr>
+          <p:nvPr>
+            <p:ph type="title"/>
+          </p:nvPr>
+        </p:nvSpPr>
+        <p:spPr/>
+        <p:txBody>
+          <a:bodyPr/>
+          <a:lstStyle/>
+          <a:p>
+            <a:pPr lvl="0" algn="ctr"/>
+            <a:r>
+              <a:rPr lang="en-US" sz="3200" b="0" dirty="0" smtClean="0">
+                <a:solidFill>
+                  <a:schemeClr val="accent1"/>
+                </a:solidFill>
+                <a:sym typeface="Arial"/>
+              </a:rPr>
+              <a:t>Be Interactive!</a:t>
+            </a:r>
+            <a:endParaRPr lang="en-US" sz="3200" b="0" dirty="0">
+              <a:solidFill>
+                <a:schemeClr val="accent1"/>
+              </a:solidFill>
+              <a:sym typeface="Arial"/>
+            </a:endParaRPr>
+          </a:p>
+        </p:txBody>
+      </p:sp>
+      <p:sp>
+        <p:nvSpPr>
+          <p:cNvPr id="4" name="Slide Number Placeholder 1"/>
+          <p:cNvSpPr>
+            <a:spLocks noGrp="1"/>
+          </p:cNvSpPr>
+          <p:nvPr>
+            <p:ph type="sldNum" sz="quarter" idx="12"/>
+          </p:nvPr>
+        </p:nvSpPr>
+        <p:spPr>
+          <a:xfrm>
+            <a:off x="48247" y="4848095"/>
+            <a:ext cx="373338" cy="273844"/>
+          </a:xfrm>
+        </p:spPr>
+        <p:txBody>
+          <a:bodyPr/>
+          <a:lstStyle/>
+          <a:p>
+            <a:fld id="{ADA07C09-8A41-3B46-A636-3955072BBB4F}" type="slidenum">
+              <a:rPr lang="en-US" smtClean="0"/>
+              <a:t>6</a:t>
+            </a:fld>
+            <a:endParaRPr lang="en-US" dirty="0"/>
+          </a:p>
+        </p:txBody>
+      </p:sp>
+      <p:pic>
+        <p:nvPicPr>
+          <p:cNvPr id="3" name="Picture 2"/>
+          <p:cNvPicPr>
+            <a:picLocks noChangeAspect="1"/>
+          </p:cNvPicPr>
+          <p:nvPr/>
+        </p:nvPicPr>
+        <p:blipFill>
+          <a:blip r:embed="rId3"/>
+          <a:stretch>
+            <a:fillRect/>
+          </a:stretch>
+        </p:blipFill>
+        <p:spPr>
+          <a:xfrm>
+            <a:off x="1524001" y="1090354"/>
+            <a:ext cx="5815276" cy="3271093"/>
+          </a:xfrm>
+          <a:prstGeom prst="rect">
+            <a:avLst/>
+          </a:prstGeom>
+        </p:spPr>
+      </p:pic>
+    </p:spTree>
+    <p:extLst>
+      <p:ext uri="{BB962C8B-B14F-4D97-AF65-F5344CB8AC3E}">
+        <p14:creationId xmlns:p14="http://schemas.microsoft.com/office/powerpoint/2010/main" val="867242128"/>
+      </p:ext>
+    </p:extLst>
+  </p:cSld>
+  <p:clrMapOvr>
+    <a:masterClrMapping/>
+  </p:clrMapOvr>
+  <p:transition xmlns:p14="http://schemas.microsoft.com/office/powerpoint/2010/main">
+    <p:fade/>
+  </p:transition>
+  <p:timing>
+    <p:tnLst>
+      <p:par>
+        <p:cTn xmlns:p14="http://schemas.microsoft.com/office/powerpoint/2010/main" id="1" dur="indefinite" restart="never" nodeType="tmRoot"/>
+      </p:par>
+    </p:tnLst>
+  </p:timing>
+</p:sld>
+</file>
+
+<file path=ppt/slides/slide7.xml><?xml version="1.0" encoding="utf-8"?>
 <p:sld xmlns:a="http://schemas.openxmlformats.org/drawingml/2006/main" xmlns:r="http://schemas.openxmlformats.org/officeDocument/2006/relationships" xmlns:p="http://schemas.openxmlformats.org/presentationml/2006/main">
   <p:cSld>
     <p:spTree>

</xml_diff>